<commit_message>
prideti sql skaidriu uzduociu atsakymai
</commit_message>
<xml_diff>
--- a/skaidres/darbas_su_duomenimis_11.pptx
+++ b/skaidres/darbas_su_duomenimis_11.pptx
@@ -15,9 +15,8 @@
     <p:sldId id="263" r:id="rId9"/>
     <p:sldId id="264" r:id="rId10"/>
     <p:sldId id="265" r:id="rId11"/>
-    <p:sldId id="270" r:id="rId12"/>
+    <p:sldId id="269" r:id="rId12"/>
     <p:sldId id="266" r:id="rId13"/>
-    <p:sldId id="269" r:id="rId14"/>
   </p:sldIdLst>
   <p:sldSz cx="12192000" cy="6858000"/>
   <p:notesSz cx="6858000" cy="9144000"/>
@@ -116,6 +115,11 @@
       </a:defRPr>
     </a:lvl9pPr>
   </p:defaultTextStyle>
+  <p:extLst>
+    <p:ext uri="{EFAFB233-063F-42B5-8137-9DF3F51BA10A}">
+      <p15:sldGuideLst xmlns:p15="http://schemas.microsoft.com/office/powerpoint/2012/main"/>
+    </p:ext>
+  </p:extLst>
 </p:presentation>
 </file>
 
@@ -266,7 +270,7 @@
           <a:p>
             <a:fld id="{1E2EC59D-D7A0-4156-BF96-F739E4955264}" type="datetimeFigureOut">
               <a:rPr lang="en-US" smtClean="0"/>
-              <a:t>4/25/2022</a:t>
+              <a:t>5/1/2022</a:t>
             </a:fld>
             <a:endParaRPr lang="en-US"/>
           </a:p>
@@ -464,7 +468,7 @@
           <a:p>
             <a:fld id="{1E2EC59D-D7A0-4156-BF96-F739E4955264}" type="datetimeFigureOut">
               <a:rPr lang="en-US" smtClean="0"/>
-              <a:t>4/25/2022</a:t>
+              <a:t>5/1/2022</a:t>
             </a:fld>
             <a:endParaRPr lang="en-US"/>
           </a:p>
@@ -672,7 +676,7 @@
           <a:p>
             <a:fld id="{1E2EC59D-D7A0-4156-BF96-F739E4955264}" type="datetimeFigureOut">
               <a:rPr lang="en-US" smtClean="0"/>
-              <a:t>4/25/2022</a:t>
+              <a:t>5/1/2022</a:t>
             </a:fld>
             <a:endParaRPr lang="en-US"/>
           </a:p>
@@ -870,7 +874,7 @@
           <a:p>
             <a:fld id="{1E2EC59D-D7A0-4156-BF96-F739E4955264}" type="datetimeFigureOut">
               <a:rPr lang="en-US" smtClean="0"/>
-              <a:t>4/25/2022</a:t>
+              <a:t>5/1/2022</a:t>
             </a:fld>
             <a:endParaRPr lang="en-US"/>
           </a:p>
@@ -1145,7 +1149,7 @@
           <a:p>
             <a:fld id="{1E2EC59D-D7A0-4156-BF96-F739E4955264}" type="datetimeFigureOut">
               <a:rPr lang="en-US" smtClean="0"/>
-              <a:t>4/25/2022</a:t>
+              <a:t>5/1/2022</a:t>
             </a:fld>
             <a:endParaRPr lang="en-US"/>
           </a:p>
@@ -1410,7 +1414,7 @@
           <a:p>
             <a:fld id="{1E2EC59D-D7A0-4156-BF96-F739E4955264}" type="datetimeFigureOut">
               <a:rPr lang="en-US" smtClean="0"/>
-              <a:t>4/25/2022</a:t>
+              <a:t>5/1/2022</a:t>
             </a:fld>
             <a:endParaRPr lang="en-US"/>
           </a:p>
@@ -1822,7 +1826,7 @@
           <a:p>
             <a:fld id="{1E2EC59D-D7A0-4156-BF96-F739E4955264}" type="datetimeFigureOut">
               <a:rPr lang="en-US" smtClean="0"/>
-              <a:t>4/25/2022</a:t>
+              <a:t>5/1/2022</a:t>
             </a:fld>
             <a:endParaRPr lang="en-US"/>
           </a:p>
@@ -1963,7 +1967,7 @@
           <a:p>
             <a:fld id="{1E2EC59D-D7A0-4156-BF96-F739E4955264}" type="datetimeFigureOut">
               <a:rPr lang="en-US" smtClean="0"/>
-              <a:t>4/25/2022</a:t>
+              <a:t>5/1/2022</a:t>
             </a:fld>
             <a:endParaRPr lang="en-US"/>
           </a:p>
@@ -2076,7 +2080,7 @@
           <a:p>
             <a:fld id="{1E2EC59D-D7A0-4156-BF96-F739E4955264}" type="datetimeFigureOut">
               <a:rPr lang="en-US" smtClean="0"/>
-              <a:t>4/25/2022</a:t>
+              <a:t>5/1/2022</a:t>
             </a:fld>
             <a:endParaRPr lang="en-US"/>
           </a:p>
@@ -2387,7 +2391,7 @@
           <a:p>
             <a:fld id="{1E2EC59D-D7A0-4156-BF96-F739E4955264}" type="datetimeFigureOut">
               <a:rPr lang="en-US" smtClean="0"/>
-              <a:t>4/25/2022</a:t>
+              <a:t>5/1/2022</a:t>
             </a:fld>
             <a:endParaRPr lang="en-US"/>
           </a:p>
@@ -2675,7 +2679,7 @@
           <a:p>
             <a:fld id="{1E2EC59D-D7A0-4156-BF96-F739E4955264}" type="datetimeFigureOut">
               <a:rPr lang="en-US" smtClean="0"/>
-              <a:t>4/25/2022</a:t>
+              <a:t>5/1/2022</a:t>
             </a:fld>
             <a:endParaRPr lang="en-US"/>
           </a:p>
@@ -2916,7 +2920,7 @@
           <a:p>
             <a:fld id="{1E2EC59D-D7A0-4156-BF96-F739E4955264}" type="datetimeFigureOut">
               <a:rPr lang="en-US" smtClean="0"/>
-              <a:t>4/25/2022</a:t>
+              <a:t>5/1/2022</a:t>
             </a:fld>
             <a:endParaRPr lang="en-US"/>
           </a:p>
@@ -3622,24 +3626,133 @@
             </a:pPr>
             <a:r>
               <a:rPr lang="lt-LT" dirty="0"/>
-              <a:t>1. Sukurkite procedūr</a:t>
-            </a:r>
+              <a:t>Parašykite procedūras žemiau esančioms užklausoms. Remkites matytas pavyzdžiais.</a:t>
+            </a:r>
+          </a:p>
+          <a:p>
+            <a:pPr marL="0" indent="0">
+              <a:buNone/>
+            </a:pPr>
+            <a:r>
+              <a:rPr lang="lt-LT" dirty="0"/>
+              <a:t>1. Kiek yra pardavinėjama skirtingų produktų? </a:t>
+            </a:r>
+          </a:p>
+          <a:p>
+            <a:pPr marL="0" indent="0">
+              <a:buNone/>
+            </a:pPr>
+            <a:r>
+              <a:rPr lang="lt-LT" dirty="0"/>
+              <a:t>2. Atraskite klientus, kurie neturi pardavimų atstovo. Grąžinkite klientų vardus ir miestus iš kur jie yra. </a:t>
+            </a:r>
+          </a:p>
+          <a:p>
+            <a:pPr marL="0" indent="0">
+              <a:buNone/>
+            </a:pPr>
+            <a:r>
+              <a:rPr lang="lt-LT" dirty="0"/>
+              <a:t>3. Kokie yra VP ir Managers vardai? Vardus ir pavardes išveskite viename stulpelyje.</a:t>
+            </a:r>
+            <a:endParaRPr lang="en-US" dirty="0"/>
+          </a:p>
+          <a:p>
+            <a:pPr marL="0" indent="0">
+              <a:buNone/>
+            </a:pPr>
             <a:r>
               <a:rPr lang="en-US" dirty="0"/>
-              <a:t>as</a:t>
+              <a:t>4. </a:t>
+            </a:r>
+            <a:r>
+              <a:rPr lang="en-US" dirty="0" err="1"/>
+              <a:t>Raskite</a:t>
+            </a:r>
+            <a:r>
+              <a:rPr lang="en-US" dirty="0"/>
+              <a:t> </a:t>
+            </a:r>
+            <a:r>
+              <a:rPr lang="en-US" dirty="0" err="1"/>
+              <a:t>klientus</a:t>
+            </a:r>
+            <a:r>
+              <a:rPr lang="en-US" dirty="0"/>
+              <a:t>, </a:t>
+            </a:r>
+            <a:r>
+              <a:rPr lang="en-US" dirty="0" err="1"/>
+              <a:t>kurie</a:t>
+            </a:r>
+            <a:r>
+              <a:rPr lang="en-US" dirty="0"/>
+              <a:t> </a:t>
+            </a:r>
+            <a:r>
+              <a:rPr lang="en-US" dirty="0" err="1"/>
+              <a:t>yra</a:t>
+            </a:r>
+            <a:r>
+              <a:rPr lang="en-US" dirty="0"/>
+              <a:t> </a:t>
+            </a:r>
+            <a:r>
+              <a:rPr lang="en-US" dirty="0" err="1"/>
+              <a:t>i</a:t>
             </a:r>
             <a:r>
               <a:rPr lang="lt-LT" dirty="0"/>
-              <a:t> naudodamiesi procedura_</a:t>
+              <a:t>š</a:t>
             </a:r>
             <a:r>
               <a:rPr lang="en-US" dirty="0"/>
-              <a:t>3</a:t>
-            </a:r>
-            <a:r>
-              <a:rPr lang="lt-LT" dirty="0"/>
-              <a:t>.sql skriptu. </a:t>
-            </a:r>
+              <a:t> </a:t>
+            </a:r>
+            <a:r>
+              <a:rPr lang="en-US" dirty="0" err="1"/>
+              <a:t>nurodyto</a:t>
+            </a:r>
+            <a:r>
+              <a:rPr lang="en-US" dirty="0"/>
+              <a:t> </a:t>
+            </a:r>
+            <a:r>
+              <a:rPr lang="en-US" dirty="0" err="1"/>
+              <a:t>miesto</a:t>
+            </a:r>
+            <a:r>
+              <a:rPr lang="en-US" dirty="0"/>
+              <a:t>. </a:t>
+            </a:r>
+            <a:endParaRPr lang="lt-LT" dirty="0"/>
+          </a:p>
+          <a:p>
+            <a:pPr marL="0" indent="0">
+              <a:buNone/>
+            </a:pPr>
+            <a:r>
+              <a:rPr lang="en-US" dirty="0" err="1"/>
+              <a:t>Pvz</a:t>
+            </a:r>
+            <a:r>
+              <a:rPr lang="en-US" dirty="0"/>
+              <a:t>. call </a:t>
+            </a:r>
+            <a:r>
+              <a:rPr lang="en-US" dirty="0" err="1"/>
+              <a:t>ClientsByCity</a:t>
+            </a:r>
+            <a:r>
+              <a:rPr lang="en-US" dirty="0"/>
+              <a:t>('Frankfurt');</a:t>
+            </a:r>
+            <a:endParaRPr lang="lt-LT" dirty="0"/>
+          </a:p>
+          <a:p>
+            <a:pPr marL="0" indent="0">
+              <a:buNone/>
+            </a:pPr>
             <a:endParaRPr lang="en-US" dirty="0"/>
           </a:p>
         </p:txBody>
@@ -3647,7 +3760,7 @@
     </p:spTree>
     <p:extLst>
       <p:ext uri="{BB962C8B-B14F-4D97-AF65-F5344CB8AC3E}">
-        <p14:creationId xmlns:p14="http://schemas.microsoft.com/office/powerpoint/2010/main" val="392772705"/>
+        <p14:creationId xmlns:p14="http://schemas.microsoft.com/office/powerpoint/2010/main" val="2640449069"/>
       </p:ext>
     </p:extLst>
   </p:cSld>
@@ -3799,129 +3912,6 @@
     <p:extLst>
       <p:ext uri="{BB962C8B-B14F-4D97-AF65-F5344CB8AC3E}">
         <p14:creationId xmlns:p14="http://schemas.microsoft.com/office/powerpoint/2010/main" val="3059498200"/>
-      </p:ext>
-    </p:extLst>
-  </p:cSld>
-  <p:clrMapOvr>
-    <a:masterClrMapping/>
-  </p:clrMapOvr>
-</p:sld>
-</file>
-
-<file path=ppt/slides/slide13.xml><?xml version="1.0" encoding="utf-8"?>
-<p:sld xmlns:a="http://schemas.openxmlformats.org/drawingml/2006/main" xmlns:r="http://schemas.openxmlformats.org/officeDocument/2006/relationships" xmlns:p="http://schemas.openxmlformats.org/presentationml/2006/main">
-  <p:cSld>
-    <p:spTree>
-      <p:nvGrpSpPr>
-        <p:cNvPr id="1" name=""/>
-        <p:cNvGrpSpPr/>
-        <p:nvPr/>
-      </p:nvGrpSpPr>
-      <p:grpSpPr>
-        <a:xfrm>
-          <a:off x="0" y="0"/>
-          <a:ext cx="0" cy="0"/>
-          <a:chOff x="0" y="0"/>
-          <a:chExt cx="0" cy="0"/>
-        </a:xfrm>
-      </p:grpSpPr>
-      <p:sp>
-        <p:nvSpPr>
-          <p:cNvPr id="2" name="Title 1">
-            <a:extLst>
-              <a:ext uri="{FF2B5EF4-FFF2-40B4-BE49-F238E27FC236}">
-                <a16:creationId xmlns:a16="http://schemas.microsoft.com/office/drawing/2014/main" id="{5230AEAA-51CA-40BE-98F5-363458B454EA}"/>
-              </a:ext>
-            </a:extLst>
-          </p:cNvPr>
-          <p:cNvSpPr>
-            <a:spLocks noGrp="1"/>
-          </p:cNvSpPr>
-          <p:nvPr>
-            <p:ph type="title"/>
-          </p:nvPr>
-        </p:nvSpPr>
-        <p:spPr/>
-        <p:txBody>
-          <a:bodyPr/>
-          <a:lstStyle/>
-          <a:p>
-            <a:r>
-              <a:rPr lang="lt-LT" dirty="0"/>
-              <a:t>Užduotis</a:t>
-            </a:r>
-            <a:endParaRPr lang="en-US" dirty="0"/>
-          </a:p>
-        </p:txBody>
-      </p:sp>
-      <p:sp>
-        <p:nvSpPr>
-          <p:cNvPr id="3" name="Content Placeholder 2">
-            <a:extLst>
-              <a:ext uri="{FF2B5EF4-FFF2-40B4-BE49-F238E27FC236}">
-                <a16:creationId xmlns:a16="http://schemas.microsoft.com/office/drawing/2014/main" id="{F11E9171-A47E-40EA-ADCE-3B4CE0F1FF7B}"/>
-              </a:ext>
-            </a:extLst>
-          </p:cNvPr>
-          <p:cNvSpPr>
-            <a:spLocks noGrp="1"/>
-          </p:cNvSpPr>
-          <p:nvPr>
-            <p:ph idx="1"/>
-          </p:nvPr>
-        </p:nvSpPr>
-        <p:spPr/>
-        <p:txBody>
-          <a:bodyPr/>
-          <a:lstStyle/>
-          <a:p>
-            <a:pPr marL="0" indent="0">
-              <a:buNone/>
-            </a:pPr>
-            <a:r>
-              <a:rPr lang="lt-LT" dirty="0"/>
-              <a:t>Parašykite procedūras šioms užklausoms</a:t>
-            </a:r>
-          </a:p>
-          <a:p>
-            <a:pPr marL="0" indent="0">
-              <a:buNone/>
-            </a:pPr>
-            <a:r>
-              <a:rPr lang="lt-LT" dirty="0"/>
-              <a:t>1. Kiek yra pardavinėjama skirtingų produktų? </a:t>
-            </a:r>
-          </a:p>
-          <a:p>
-            <a:pPr marL="0" indent="0">
-              <a:buNone/>
-            </a:pPr>
-            <a:r>
-              <a:rPr lang="lt-LT" dirty="0"/>
-              <a:t>2. Atraskite klientus, kurie neturi pardavimų atstovo. Grąžinkite klientų vardus ir miestus iš kur jie yra. </a:t>
-            </a:r>
-          </a:p>
-          <a:p>
-            <a:pPr marL="0" indent="0">
-              <a:buNone/>
-            </a:pPr>
-            <a:r>
-              <a:rPr lang="lt-LT" dirty="0"/>
-              <a:t>3. Kokie yra VP ir Managers vardai? Vardus ir pavardes išveskite viename stulpelyje.</a:t>
-            </a:r>
-          </a:p>
-          <a:p>
-            <a:pPr marL="0" indent="0">
-              <a:buNone/>
-            </a:pPr>
-            <a:endParaRPr lang="en-US" dirty="0"/>
-          </a:p>
-        </p:txBody>
-      </p:sp>
-    </p:spTree>
-    <p:extLst>
-      <p:ext uri="{BB962C8B-B14F-4D97-AF65-F5344CB8AC3E}">
-        <p14:creationId xmlns:p14="http://schemas.microsoft.com/office/powerpoint/2010/main" val="2640449069"/>
       </p:ext>
     </p:extLst>
   </p:cSld>

</xml_diff>